<commit_message>
Moved parse to grocery simulation
</commit_message>
<xml_diff>
--- a/admin/Comp 2000 - 2020-1sp -- 1 Bag App - Group # Presentation -- 2020-01-24 0707.pptx
+++ b/admin/Comp 2000 - 2020-1sp -- 1 Bag App - Group # Presentation -- 2020-01-24 0707.pptx
@@ -235,7 +235,7 @@
           <a:p>
             <a:fld id="{BC5DCFEC-F192-4051-B042-7D946D09B91F}" type="datetimeFigureOut">
               <a:rPr lang="en-US" smtClean="0"/>
-              <a:t>9/18/2019</a:t>
+              <a:t>2/3/2020</a:t>
             </a:fld>
             <a:endParaRPr lang="en-US"/>
           </a:p>
@@ -413,7 +413,7 @@
           <a:p>
             <a:fld id="{288E6DCA-ADE0-4840-82A2-2C2E1E630D16}" type="datetimeFigureOut">
               <a:rPr lang="en-US" smtClean="0"/>
-              <a:t>9/18/2019</a:t>
+              <a:t>2/3/2020</a:t>
             </a:fld>
             <a:endParaRPr lang="en-US"/>
           </a:p>
@@ -2382,9 +2382,10 @@
           </a:p>
           <a:p>
             <a:r>
-              <a:rPr lang="en-US" dirty="0"/>
-              <a:t>Group #</a:t>
-            </a:r>
+              <a:rPr lang="en-US"/>
+              <a:t>Group 17</a:t>
+            </a:r>
+            <a:endParaRPr lang="en-US" dirty="0"/>
           </a:p>
         </p:txBody>
       </p:sp>
@@ -2514,7 +2515,7 @@
           <a:bodyPr/>
           <a:lstStyle/>
           <a:p>
-            <a:endParaRPr lang="en-US"/>
+            <a:endParaRPr lang="en-US" dirty="0"/>
           </a:p>
         </p:txBody>
       </p:sp>

</xml_diff>